<commit_message>
vague start of slides days 2,3, footer updates
</commit_message>
<xml_diff>
--- a/slides/day2_tidyverse.pptx
+++ b/slides/day2_tidyverse.pptx
@@ -5,18 +5,17 @@
     <p:sldMasterId id="2147483852" r:id="rId1"/>
   </p:sldMasterIdLst>
   <p:notesMasterIdLst>
-    <p:notesMasterId r:id="rId11"/>
+    <p:notesMasterId r:id="rId10"/>
   </p:notesMasterIdLst>
   <p:sldIdLst>
     <p:sldId id="258" r:id="rId2"/>
     <p:sldId id="257" r:id="rId3"/>
     <p:sldId id="259" r:id="rId4"/>
-    <p:sldId id="260" r:id="rId5"/>
-    <p:sldId id="263" r:id="rId6"/>
-    <p:sldId id="264" r:id="rId7"/>
-    <p:sldId id="266" r:id="rId8"/>
-    <p:sldId id="265" r:id="rId9"/>
-    <p:sldId id="267" r:id="rId10"/>
+    <p:sldId id="264" r:id="rId5"/>
+    <p:sldId id="266" r:id="rId6"/>
+    <p:sldId id="265" r:id="rId7"/>
+    <p:sldId id="267" r:id="rId8"/>
+    <p:sldId id="268" r:id="rId9"/>
   </p:sldIdLst>
   <p:sldSz cx="12192000" cy="6858000"/>
   <p:notesSz cx="6858000" cy="9144000"/>
@@ -4671,1412 +4670,6 @@
           <a:p>
             <a:r>
               <a:rPr lang="en-US" dirty="0" smtClean="0"/>
-              <a:t>Messy vs tidy data</a:t>
-            </a:r>
-            <a:endParaRPr lang="en-US" dirty="0"/>
-          </a:p>
-        </p:txBody>
-      </p:sp>
-      <p:pic>
-        <p:nvPicPr>
-          <p:cNvPr id="4" name="Content Placeholder 3"/>
-          <p:cNvPicPr>
-            <a:picLocks noGrp="1" noChangeAspect="1"/>
-          </p:cNvPicPr>
-          <p:nvPr>
-            <p:ph idx="1"/>
-          </p:nvPr>
-        </p:nvPicPr>
-        <p:blipFill rotWithShape="1">
-          <a:blip r:embed="rId2">
-            <a:extLst>
-              <a:ext uri="{28A0092B-C50C-407E-A947-70E740481C1C}">
-                <a14:useLocalDpi xmlns:a14="http://schemas.microsoft.com/office/drawing/2010/main" val="0"/>
-              </a:ext>
-            </a:extLst>
-          </a:blip>
-          <a:srcRect l="50702" t="38894"/>
-          <a:stretch/>
-        </p:blipFill>
-        <p:spPr>
-          <a:xfrm>
-            <a:off x="6183086" y="2478338"/>
-            <a:ext cx="3971108" cy="3695627"/>
-          </a:xfrm>
-        </p:spPr>
-      </p:pic>
-      <p:pic>
-        <p:nvPicPr>
-          <p:cNvPr id="5" name="Content Placeholder 3"/>
-          <p:cNvPicPr>
-            <a:picLocks noChangeAspect="1"/>
-          </p:cNvPicPr>
-          <p:nvPr/>
-        </p:nvPicPr>
-        <p:blipFill rotWithShape="1">
-          <a:blip r:embed="rId2">
-            <a:extLst>
-              <a:ext uri="{28A0092B-C50C-407E-A947-70E740481C1C}">
-                <a14:useLocalDpi xmlns:a14="http://schemas.microsoft.com/office/drawing/2010/main" val="0"/>
-              </a:ext>
-            </a:extLst>
-          </a:blip>
-          <a:srcRect t="38639" r="47496" b="255"/>
-          <a:stretch/>
-        </p:blipFill>
-        <p:spPr>
-          <a:xfrm>
-            <a:off x="1953623" y="2478338"/>
-            <a:ext cx="4229463" cy="3695627"/>
-          </a:xfrm>
-          <a:prstGeom prst="rect">
-            <a:avLst/>
-          </a:prstGeom>
-        </p:spPr>
-      </p:pic>
-      <p:sp>
-        <p:nvSpPr>
-          <p:cNvPr id="6" name="TextBox 5"/>
-          <p:cNvSpPr txBox="1"/>
-          <p:nvPr/>
-        </p:nvSpPr>
-        <p:spPr>
-          <a:xfrm>
-            <a:off x="2119085" y="5196114"/>
-            <a:ext cx="4644571" cy="646331"/>
-          </a:xfrm>
-          <a:prstGeom prst="rect">
-            <a:avLst/>
-          </a:prstGeom>
-          <a:noFill/>
-        </p:spPr>
-        <p:txBody>
-          <a:bodyPr wrap="square" rtlCol="0">
-            <a:spAutoFit/>
-          </a:bodyPr>
-          <a:lstStyle/>
-          <a:p>
-            <a:r>
-              <a:rPr lang="en-US" dirty="0" smtClean="0"/>
-              <a:t>What are the </a:t>
-            </a:r>
-            <a:r>
-              <a:rPr lang="en-US" b="1" dirty="0" smtClean="0"/>
-              <a:t>variables</a:t>
-            </a:r>
-            <a:r>
-              <a:rPr lang="en-US" dirty="0" smtClean="0"/>
-              <a:t> in this data?</a:t>
-            </a:r>
-          </a:p>
-          <a:p>
-            <a:r>
-              <a:rPr lang="en-US" dirty="0" smtClean="0"/>
-              <a:t>What are the </a:t>
-            </a:r>
-            <a:r>
-              <a:rPr lang="en-US" b="1" dirty="0" smtClean="0"/>
-              <a:t>observations</a:t>
-            </a:r>
-            <a:r>
-              <a:rPr lang="en-US" dirty="0" smtClean="0"/>
-              <a:t> in this data?</a:t>
-            </a:r>
-            <a:endParaRPr lang="en-US" dirty="0"/>
-          </a:p>
-        </p:txBody>
-      </p:sp>
-    </p:spTree>
-    <p:extLst>
-      <p:ext uri="{BB962C8B-B14F-4D97-AF65-F5344CB8AC3E}">
-        <p14:creationId xmlns:p14="http://schemas.microsoft.com/office/powerpoint/2010/main" val="172478979"/>
-      </p:ext>
-    </p:extLst>
-  </p:cSld>
-  <p:clrMapOvr>
-    <a:masterClrMapping/>
-  </p:clrMapOvr>
-  <p:timing>
-    <p:tnLst>
-      <p:par>
-        <p:cTn id="1" dur="indefinite" restart="never" nodeType="tmRoot"/>
-      </p:par>
-    </p:tnLst>
-  </p:timing>
-</p:sld>
-</file>
-
-<file path=ppt/slides/slide5.xml><?xml version="1.0" encoding="utf-8"?>
-<p:sld xmlns:a="http://schemas.openxmlformats.org/drawingml/2006/main" xmlns:r="http://schemas.openxmlformats.org/officeDocument/2006/relationships" xmlns:p="http://schemas.openxmlformats.org/presentationml/2006/main">
-  <p:cSld>
-    <p:spTree>
-      <p:nvGrpSpPr>
-        <p:cNvPr id="1" name=""/>
-        <p:cNvGrpSpPr/>
-        <p:nvPr/>
-      </p:nvGrpSpPr>
-      <p:grpSpPr>
-        <a:xfrm>
-          <a:off x="0" y="0"/>
-          <a:ext cx="0" cy="0"/>
-          <a:chOff x="0" y="0"/>
-          <a:chExt cx="0" cy="0"/>
-        </a:xfrm>
-      </p:grpSpPr>
-      <p:sp>
-        <p:nvSpPr>
-          <p:cNvPr id="2" name="Title 1"/>
-          <p:cNvSpPr>
-            <a:spLocks noGrp="1"/>
-          </p:cNvSpPr>
-          <p:nvPr>
-            <p:ph type="title"/>
-          </p:nvPr>
-        </p:nvSpPr>
-        <p:spPr/>
-        <p:txBody>
-          <a:bodyPr/>
-          <a:lstStyle/>
-          <a:p>
-            <a:r>
-              <a:rPr lang="en-US" dirty="0" smtClean="0"/>
-              <a:t>Exercise</a:t>
-            </a:r>
-            <a:endParaRPr lang="en-US" dirty="0"/>
-          </a:p>
-        </p:txBody>
-      </p:sp>
-      <p:sp>
-        <p:nvSpPr>
-          <p:cNvPr id="3" name="Content Placeholder 2"/>
-          <p:cNvSpPr>
-            <a:spLocks noGrp="1"/>
-          </p:cNvSpPr>
-          <p:nvPr>
-            <p:ph idx="1"/>
-          </p:nvPr>
-        </p:nvSpPr>
-        <p:spPr/>
-        <p:txBody>
-          <a:bodyPr/>
-          <a:lstStyle/>
-          <a:p>
-            <a:endParaRPr lang="en-US" dirty="0" smtClean="0"/>
-          </a:p>
-          <a:p>
-            <a:r>
-              <a:rPr lang="en-US" dirty="0" smtClean="0"/>
-              <a:t>How can we convert this table into a tidy data frame?</a:t>
-            </a:r>
-            <a:endParaRPr lang="en-US" dirty="0"/>
-          </a:p>
-        </p:txBody>
-      </p:sp>
-      <p:graphicFrame>
-        <p:nvGraphicFramePr>
-          <p:cNvPr id="6" name="Table 5"/>
-          <p:cNvGraphicFramePr>
-            <a:graphicFrameLocks noGrp="1"/>
-          </p:cNvGraphicFramePr>
-          <p:nvPr>
-            <p:extLst>
-              <p:ext uri="{D42A27DB-BD31-4B8C-83A1-F6EECF244321}">
-                <p14:modId xmlns:p14="http://schemas.microsoft.com/office/powerpoint/2010/main" val="2000360611"/>
-              </p:ext>
-            </p:extLst>
-          </p:nvPr>
-        </p:nvGraphicFramePr>
-        <p:xfrm>
-          <a:off x="1097280" y="3081262"/>
-          <a:ext cx="4746172" cy="1112520"/>
-        </p:xfrm>
-        <a:graphic>
-          <a:graphicData uri="http://schemas.openxmlformats.org/drawingml/2006/table">
-            <a:tbl>
-              <a:tblPr firstRow="1" bandRow="1">
-                <a:tableStyleId>{5C22544A-7EE6-4342-B048-85BDC9FD1C3A}</a:tableStyleId>
-              </a:tblPr>
-              <a:tblGrid>
-                <a:gridCol w="1567543"/>
-                <a:gridCol w="1857828"/>
-                <a:gridCol w="1320801"/>
-              </a:tblGrid>
-              <a:tr h="370840">
-                <a:tc>
-                  <a:txBody>
-                    <a:bodyPr/>
-                    <a:lstStyle/>
-                    <a:p>
-                      <a:pPr algn="ctr"/>
-                      <a:endParaRPr lang="en-US" dirty="0">
-                        <a:solidFill>
-                          <a:schemeClr val="tx1"/>
-                        </a:solidFill>
-                      </a:endParaRPr>
-                    </a:p>
-                  </a:txBody>
-                  <a:tcPr>
-                    <a:lnR w="12700" cap="flat" cmpd="sng" algn="ctr">
-                      <a:solidFill>
-                        <a:schemeClr val="tx1"/>
-                      </a:solidFill>
-                      <a:prstDash val="solid"/>
-                      <a:round/>
-                      <a:headEnd type="none" w="med" len="med"/>
-                      <a:tailEnd type="none" w="med" len="med"/>
-                    </a:lnR>
-                    <a:lnT w="12700" cap="flat" cmpd="sng" algn="ctr">
-                      <a:noFill/>
-                      <a:prstDash val="solid"/>
-                      <a:round/>
-                      <a:headEnd type="none" w="med" len="med"/>
-                      <a:tailEnd type="none" w="med" len="med"/>
-                    </a:lnT>
-                    <a:lnB w="12700" cap="flat" cmpd="sng" algn="ctr">
-                      <a:solidFill>
-                        <a:schemeClr val="tx1"/>
-                      </a:solidFill>
-                      <a:prstDash val="solid"/>
-                      <a:round/>
-                      <a:headEnd type="none" w="med" len="med"/>
-                      <a:tailEnd type="none" w="med" len="med"/>
-                    </a:lnB>
-                    <a:noFill/>
-                  </a:tcPr>
-                </a:tc>
-                <a:tc>
-                  <a:txBody>
-                    <a:bodyPr/>
-                    <a:lstStyle/>
-                    <a:p>
-                      <a:pPr algn="ctr"/>
-                      <a:r>
-                        <a:rPr lang="en-US" dirty="0" smtClean="0">
-                          <a:solidFill>
-                            <a:schemeClr val="tx1"/>
-                          </a:solidFill>
-                        </a:rPr>
-                        <a:t>survived</a:t>
-                      </a:r>
-                      <a:endParaRPr lang="en-US" dirty="0">
-                        <a:solidFill>
-                          <a:schemeClr val="tx1"/>
-                        </a:solidFill>
-                      </a:endParaRPr>
-                    </a:p>
-                  </a:txBody>
-                  <a:tcPr>
-                    <a:lnL w="12700" cap="flat" cmpd="sng" algn="ctr">
-                      <a:solidFill>
-                        <a:schemeClr val="tx1"/>
-                      </a:solidFill>
-                      <a:prstDash val="solid"/>
-                      <a:round/>
-                      <a:headEnd type="none" w="med" len="med"/>
-                      <a:tailEnd type="none" w="med" len="med"/>
-                    </a:lnL>
-                    <a:lnR w="12700" cap="flat" cmpd="sng" algn="ctr">
-                      <a:noFill/>
-                      <a:prstDash val="solid"/>
-                      <a:round/>
-                      <a:headEnd type="none" w="med" len="med"/>
-                      <a:tailEnd type="none" w="med" len="med"/>
-                    </a:lnR>
-                    <a:lnT w="12700" cap="flat" cmpd="sng" algn="ctr">
-                      <a:noFill/>
-                      <a:prstDash val="solid"/>
-                      <a:round/>
-                      <a:headEnd type="none" w="med" len="med"/>
-                      <a:tailEnd type="none" w="med" len="med"/>
-                    </a:lnT>
-                    <a:lnB w="12700" cap="flat" cmpd="sng" algn="ctr">
-                      <a:solidFill>
-                        <a:schemeClr val="tx1"/>
-                      </a:solidFill>
-                      <a:prstDash val="solid"/>
-                      <a:round/>
-                      <a:headEnd type="none" w="med" len="med"/>
-                      <a:tailEnd type="none" w="med" len="med"/>
-                    </a:lnB>
-                    <a:noFill/>
-                  </a:tcPr>
-                </a:tc>
-                <a:tc>
-                  <a:txBody>
-                    <a:bodyPr/>
-                    <a:lstStyle/>
-                    <a:p>
-                      <a:pPr algn="ctr"/>
-                      <a:r>
-                        <a:rPr lang="en-US" dirty="0" smtClean="0">
-                          <a:solidFill>
-                            <a:schemeClr val="tx1"/>
-                          </a:solidFill>
-                        </a:rPr>
-                        <a:t>died</a:t>
-                      </a:r>
-                      <a:endParaRPr lang="en-US" dirty="0">
-                        <a:solidFill>
-                          <a:schemeClr val="tx1"/>
-                        </a:solidFill>
-                      </a:endParaRPr>
-                    </a:p>
-                  </a:txBody>
-                  <a:tcPr>
-                    <a:lnL w="12700" cap="flat" cmpd="sng" algn="ctr">
-                      <a:noFill/>
-                      <a:prstDash val="solid"/>
-                      <a:round/>
-                      <a:headEnd type="none" w="med" len="med"/>
-                      <a:tailEnd type="none" w="med" len="med"/>
-                    </a:lnL>
-                    <a:lnT w="12700" cap="flat" cmpd="sng" algn="ctr">
-                      <a:noFill/>
-                      <a:prstDash val="solid"/>
-                      <a:round/>
-                      <a:headEnd type="none" w="med" len="med"/>
-                      <a:tailEnd type="none" w="med" len="med"/>
-                    </a:lnT>
-                    <a:lnB w="12700" cap="flat" cmpd="sng" algn="ctr">
-                      <a:solidFill>
-                        <a:schemeClr val="tx1"/>
-                      </a:solidFill>
-                      <a:prstDash val="solid"/>
-                      <a:round/>
-                      <a:headEnd type="none" w="med" len="med"/>
-                      <a:tailEnd type="none" w="med" len="med"/>
-                    </a:lnB>
-                    <a:noFill/>
-                  </a:tcPr>
-                </a:tc>
-              </a:tr>
-              <a:tr h="370840">
-                <a:tc>
-                  <a:txBody>
-                    <a:bodyPr/>
-                    <a:lstStyle/>
-                    <a:p>
-                      <a:pPr algn="ctr"/>
-                      <a:r>
-                        <a:rPr lang="en-US" b="1" dirty="0" smtClean="0"/>
-                        <a:t>drug</a:t>
-                      </a:r>
-                      <a:endParaRPr lang="en-US" b="1" dirty="0"/>
-                    </a:p>
-                  </a:txBody>
-                  <a:tcPr>
-                    <a:lnR w="12700" cap="flat" cmpd="sng" algn="ctr">
-                      <a:solidFill>
-                        <a:schemeClr val="tx1"/>
-                      </a:solidFill>
-                      <a:prstDash val="solid"/>
-                      <a:round/>
-                      <a:headEnd type="none" w="med" len="med"/>
-                      <a:tailEnd type="none" w="med" len="med"/>
-                    </a:lnR>
-                    <a:lnT w="12700" cap="flat" cmpd="sng" algn="ctr">
-                      <a:solidFill>
-                        <a:schemeClr val="tx1"/>
-                      </a:solidFill>
-                      <a:prstDash val="solid"/>
-                      <a:round/>
-                      <a:headEnd type="none" w="med" len="med"/>
-                      <a:tailEnd type="none" w="med" len="med"/>
-                    </a:lnT>
-                    <a:noFill/>
-                  </a:tcPr>
-                </a:tc>
-                <a:tc>
-                  <a:txBody>
-                    <a:bodyPr/>
-                    <a:lstStyle/>
-                    <a:p>
-                      <a:pPr algn="ctr"/>
-                      <a:r>
-                        <a:rPr lang="en-US" dirty="0" smtClean="0"/>
-                        <a:t>15</a:t>
-                      </a:r>
-                      <a:endParaRPr lang="en-US" dirty="0"/>
-                    </a:p>
-                  </a:txBody>
-                  <a:tcPr>
-                    <a:lnL w="12700" cap="flat" cmpd="sng" algn="ctr">
-                      <a:solidFill>
-                        <a:schemeClr val="tx1"/>
-                      </a:solidFill>
-                      <a:prstDash val="solid"/>
-                      <a:round/>
-                      <a:headEnd type="none" w="med" len="med"/>
-                      <a:tailEnd type="none" w="med" len="med"/>
-                    </a:lnL>
-                    <a:lnR w="12700" cap="flat" cmpd="sng" algn="ctr">
-                      <a:noFill/>
-                      <a:prstDash val="solid"/>
-                      <a:round/>
-                      <a:headEnd type="none" w="med" len="med"/>
-                      <a:tailEnd type="none" w="med" len="med"/>
-                    </a:lnR>
-                    <a:lnT w="12700" cap="flat" cmpd="sng" algn="ctr">
-                      <a:solidFill>
-                        <a:schemeClr val="tx1"/>
-                      </a:solidFill>
-                      <a:prstDash val="solid"/>
-                      <a:round/>
-                      <a:headEnd type="none" w="med" len="med"/>
-                      <a:tailEnd type="none" w="med" len="med"/>
-                    </a:lnT>
-                    <a:noFill/>
-                  </a:tcPr>
-                </a:tc>
-                <a:tc>
-                  <a:txBody>
-                    <a:bodyPr/>
-                    <a:lstStyle/>
-                    <a:p>
-                      <a:pPr algn="ctr"/>
-                      <a:r>
-                        <a:rPr lang="en-US" dirty="0" smtClean="0"/>
-                        <a:t>3</a:t>
-                      </a:r>
-                      <a:endParaRPr lang="en-US" dirty="0"/>
-                    </a:p>
-                  </a:txBody>
-                  <a:tcPr>
-                    <a:lnL w="12700" cap="flat" cmpd="sng" algn="ctr">
-                      <a:noFill/>
-                      <a:prstDash val="solid"/>
-                      <a:round/>
-                      <a:headEnd type="none" w="med" len="med"/>
-                      <a:tailEnd type="none" w="med" len="med"/>
-                    </a:lnL>
-                    <a:lnT w="12700" cap="flat" cmpd="sng" algn="ctr">
-                      <a:solidFill>
-                        <a:schemeClr val="tx1"/>
-                      </a:solidFill>
-                      <a:prstDash val="solid"/>
-                      <a:round/>
-                      <a:headEnd type="none" w="med" len="med"/>
-                      <a:tailEnd type="none" w="med" len="med"/>
-                    </a:lnT>
-                    <a:noFill/>
-                  </a:tcPr>
-                </a:tc>
-              </a:tr>
-              <a:tr h="370840">
-                <a:tc>
-                  <a:txBody>
-                    <a:bodyPr/>
-                    <a:lstStyle/>
-                    <a:p>
-                      <a:pPr algn="ctr"/>
-                      <a:r>
-                        <a:rPr lang="en-US" b="1" dirty="0" smtClean="0"/>
-                        <a:t>placebo</a:t>
-                      </a:r>
-                      <a:endParaRPr lang="en-US" b="1" dirty="0"/>
-                    </a:p>
-                  </a:txBody>
-                  <a:tcPr>
-                    <a:lnR w="12700" cap="flat" cmpd="sng" algn="ctr">
-                      <a:solidFill>
-                        <a:schemeClr val="tx1"/>
-                      </a:solidFill>
-                      <a:prstDash val="solid"/>
-                      <a:round/>
-                      <a:headEnd type="none" w="med" len="med"/>
-                      <a:tailEnd type="none" w="med" len="med"/>
-                    </a:lnR>
-                    <a:noFill/>
-                  </a:tcPr>
-                </a:tc>
-                <a:tc>
-                  <a:txBody>
-                    <a:bodyPr/>
-                    <a:lstStyle/>
-                    <a:p>
-                      <a:pPr algn="ctr"/>
-                      <a:r>
-                        <a:rPr lang="en-US" dirty="0" smtClean="0"/>
-                        <a:t>4</a:t>
-                      </a:r>
-                      <a:endParaRPr lang="en-US" dirty="0"/>
-                    </a:p>
-                  </a:txBody>
-                  <a:tcPr>
-                    <a:lnL w="12700" cap="flat" cmpd="sng" algn="ctr">
-                      <a:solidFill>
-                        <a:schemeClr val="tx1"/>
-                      </a:solidFill>
-                      <a:prstDash val="solid"/>
-                      <a:round/>
-                      <a:headEnd type="none" w="med" len="med"/>
-                      <a:tailEnd type="none" w="med" len="med"/>
-                    </a:lnL>
-                    <a:lnR w="12700" cap="flat" cmpd="sng" algn="ctr">
-                      <a:noFill/>
-                      <a:prstDash val="solid"/>
-                      <a:round/>
-                      <a:headEnd type="none" w="med" len="med"/>
-                      <a:tailEnd type="none" w="med" len="med"/>
-                    </a:lnR>
-                    <a:noFill/>
-                  </a:tcPr>
-                </a:tc>
-                <a:tc>
-                  <a:txBody>
-                    <a:bodyPr/>
-                    <a:lstStyle/>
-                    <a:p>
-                      <a:pPr algn="ctr"/>
-                      <a:r>
-                        <a:rPr lang="en-US" dirty="0" smtClean="0"/>
-                        <a:t>11</a:t>
-                      </a:r>
-                      <a:endParaRPr lang="en-US" dirty="0"/>
-                    </a:p>
-                  </a:txBody>
-                  <a:tcPr>
-                    <a:lnL w="12700" cap="flat" cmpd="sng" algn="ctr">
-                      <a:noFill/>
-                      <a:prstDash val="solid"/>
-                      <a:round/>
-                      <a:headEnd type="none" w="med" len="med"/>
-                      <a:tailEnd type="none" w="med" len="med"/>
-                    </a:lnL>
-                    <a:noFill/>
-                  </a:tcPr>
-                </a:tc>
-              </a:tr>
-            </a:tbl>
-          </a:graphicData>
-        </a:graphic>
-      </p:graphicFrame>
-      <p:sp>
-        <p:nvSpPr>
-          <p:cNvPr id="7" name="TextBox 6"/>
-          <p:cNvSpPr txBox="1"/>
-          <p:nvPr/>
-        </p:nvSpPr>
-        <p:spPr>
-          <a:xfrm>
-            <a:off x="1097280" y="4935462"/>
-            <a:ext cx="6900091" cy="1477328"/>
-          </a:xfrm>
-          <a:prstGeom prst="rect">
-            <a:avLst/>
-          </a:prstGeom>
-          <a:noFill/>
-        </p:spPr>
-        <p:txBody>
-          <a:bodyPr wrap="square" rtlCol="0">
-            <a:spAutoFit/>
-          </a:bodyPr>
-          <a:lstStyle/>
-          <a:p>
-            <a:pPr marL="342900" indent="-342900">
-              <a:buAutoNum type="arabicPeriod"/>
-            </a:pPr>
-            <a:r>
-              <a:rPr lang="en-US" dirty="0" smtClean="0"/>
-              <a:t>What are the </a:t>
-            </a:r>
-            <a:r>
-              <a:rPr lang="en-US" b="1" dirty="0" smtClean="0"/>
-              <a:t>variables?</a:t>
-            </a:r>
-            <a:endParaRPr lang="en-US" dirty="0" smtClean="0"/>
-          </a:p>
-          <a:p>
-            <a:pPr lvl="1"/>
-            <a:r>
-              <a:rPr lang="en-US" dirty="0" smtClean="0"/>
-              <a:t>Remember: categories of a categorical variable </a:t>
-            </a:r>
-            <a:r>
-              <a:rPr lang="en-US" i="1" dirty="0" smtClean="0"/>
-              <a:t>are not variables</a:t>
-            </a:r>
-            <a:endParaRPr lang="en-US" dirty="0"/>
-          </a:p>
-          <a:p>
-            <a:pPr lvl="1"/>
-            <a:endParaRPr lang="en-US" dirty="0" smtClean="0"/>
-          </a:p>
-          <a:p>
-            <a:pPr marL="342900" indent="-342900">
-              <a:buAutoNum type="arabicPeriod"/>
-            </a:pPr>
-            <a:r>
-              <a:rPr lang="en-US" dirty="0" smtClean="0"/>
-              <a:t>What are the </a:t>
-            </a:r>
-            <a:r>
-              <a:rPr lang="en-US" b="1" dirty="0" smtClean="0"/>
-              <a:t>observations?</a:t>
-            </a:r>
-            <a:endParaRPr lang="en-US" dirty="0" smtClean="0"/>
-          </a:p>
-          <a:p>
-            <a:pPr lvl="1"/>
-            <a:endParaRPr lang="en-US" i="1" dirty="0" smtClean="0"/>
-          </a:p>
-        </p:txBody>
-      </p:sp>
-      <p:graphicFrame>
-        <p:nvGraphicFramePr>
-          <p:cNvPr id="8" name="Table 7"/>
-          <p:cNvGraphicFramePr>
-            <a:graphicFrameLocks noGrp="1"/>
-          </p:cNvGraphicFramePr>
-          <p:nvPr>
-            <p:extLst>
-              <p:ext uri="{D42A27DB-BD31-4B8C-83A1-F6EECF244321}">
-                <p14:modId xmlns:p14="http://schemas.microsoft.com/office/powerpoint/2010/main" val="681022924"/>
-              </p:ext>
-            </p:extLst>
-          </p:nvPr>
-        </p:nvGraphicFramePr>
-        <p:xfrm>
-          <a:off x="6692536" y="3081262"/>
-          <a:ext cx="4746172" cy="1854200"/>
-        </p:xfrm>
-        <a:graphic>
-          <a:graphicData uri="http://schemas.openxmlformats.org/drawingml/2006/table">
-            <a:tbl>
-              <a:tblPr firstRow="1" bandRow="1">
-                <a:tableStyleId>{5C22544A-7EE6-4342-B048-85BDC9FD1C3A}</a:tableStyleId>
-              </a:tblPr>
-              <a:tblGrid>
-                <a:gridCol w="1567543"/>
-                <a:gridCol w="1857828"/>
-                <a:gridCol w="1320801"/>
-              </a:tblGrid>
-              <a:tr h="370840">
-                <a:tc>
-                  <a:txBody>
-                    <a:bodyPr/>
-                    <a:lstStyle/>
-                    <a:p>
-                      <a:pPr algn="ctr"/>
-                      <a:r>
-                        <a:rPr lang="en-US" dirty="0" smtClean="0">
-                          <a:solidFill>
-                            <a:srgbClr val="0070C0"/>
-                          </a:solidFill>
-                        </a:rPr>
-                        <a:t>treatment</a:t>
-                      </a:r>
-                      <a:endParaRPr lang="en-US" dirty="0">
-                        <a:solidFill>
-                          <a:srgbClr val="0070C0"/>
-                        </a:solidFill>
-                      </a:endParaRPr>
-                    </a:p>
-                  </a:txBody>
-                  <a:tcPr>
-                    <a:lnR w="12700" cap="flat" cmpd="sng" algn="ctr">
-                      <a:noFill/>
-                      <a:prstDash val="solid"/>
-                      <a:round/>
-                      <a:headEnd type="none" w="med" len="med"/>
-                      <a:tailEnd type="none" w="med" len="med"/>
-                    </a:lnR>
-                    <a:lnT w="12700" cap="flat" cmpd="sng" algn="ctr">
-                      <a:noFill/>
-                      <a:prstDash val="solid"/>
-                      <a:round/>
-                      <a:headEnd type="none" w="med" len="med"/>
-                      <a:tailEnd type="none" w="med" len="med"/>
-                    </a:lnT>
-                    <a:lnB w="12700" cap="flat" cmpd="sng" algn="ctr">
-                      <a:solidFill>
-                        <a:schemeClr val="tx1"/>
-                      </a:solidFill>
-                      <a:prstDash val="solid"/>
-                      <a:round/>
-                      <a:headEnd type="none" w="med" len="med"/>
-                      <a:tailEnd type="none" w="med" len="med"/>
-                    </a:lnB>
-                    <a:noFill/>
-                  </a:tcPr>
-                </a:tc>
-                <a:tc>
-                  <a:txBody>
-                    <a:bodyPr/>
-                    <a:lstStyle/>
-                    <a:p>
-                      <a:pPr algn="ctr"/>
-                      <a:r>
-                        <a:rPr lang="en-US" dirty="0" smtClean="0">
-                          <a:solidFill>
-                            <a:srgbClr val="0070C0"/>
-                          </a:solidFill>
-                        </a:rPr>
-                        <a:t>outcome</a:t>
-                      </a:r>
-                      <a:endParaRPr lang="en-US" dirty="0">
-                        <a:solidFill>
-                          <a:srgbClr val="0070C0"/>
-                        </a:solidFill>
-                      </a:endParaRPr>
-                    </a:p>
-                  </a:txBody>
-                  <a:tcPr>
-                    <a:lnL w="12700" cap="flat" cmpd="sng" algn="ctr">
-                      <a:noFill/>
-                      <a:prstDash val="solid"/>
-                      <a:round/>
-                      <a:headEnd type="none" w="med" len="med"/>
-                      <a:tailEnd type="none" w="med" len="med"/>
-                    </a:lnL>
-                    <a:lnR w="12700" cap="flat" cmpd="sng" algn="ctr">
-                      <a:noFill/>
-                      <a:prstDash val="solid"/>
-                      <a:round/>
-                      <a:headEnd type="none" w="med" len="med"/>
-                      <a:tailEnd type="none" w="med" len="med"/>
-                    </a:lnR>
-                    <a:lnT w="12700" cap="flat" cmpd="sng" algn="ctr">
-                      <a:noFill/>
-                      <a:prstDash val="solid"/>
-                      <a:round/>
-                      <a:headEnd type="none" w="med" len="med"/>
-                      <a:tailEnd type="none" w="med" len="med"/>
-                    </a:lnT>
-                    <a:lnB w="12700" cap="flat" cmpd="sng" algn="ctr">
-                      <a:solidFill>
-                        <a:schemeClr val="tx1"/>
-                      </a:solidFill>
-                      <a:prstDash val="solid"/>
-                      <a:round/>
-                      <a:headEnd type="none" w="med" len="med"/>
-                      <a:tailEnd type="none" w="med" len="med"/>
-                    </a:lnB>
-                    <a:noFill/>
-                  </a:tcPr>
-                </a:tc>
-                <a:tc>
-                  <a:txBody>
-                    <a:bodyPr/>
-                    <a:lstStyle/>
-                    <a:p>
-                      <a:pPr algn="ctr"/>
-                      <a:r>
-                        <a:rPr lang="en-US" dirty="0" smtClean="0">
-                          <a:solidFill>
-                            <a:srgbClr val="0070C0"/>
-                          </a:solidFill>
-                        </a:rPr>
-                        <a:t>count</a:t>
-                      </a:r>
-                      <a:endParaRPr lang="en-US" dirty="0">
-                        <a:solidFill>
-                          <a:srgbClr val="0070C0"/>
-                        </a:solidFill>
-                      </a:endParaRPr>
-                    </a:p>
-                  </a:txBody>
-                  <a:tcPr>
-                    <a:lnL w="12700" cap="flat" cmpd="sng" algn="ctr">
-                      <a:noFill/>
-                      <a:prstDash val="solid"/>
-                      <a:round/>
-                      <a:headEnd type="none" w="med" len="med"/>
-                      <a:tailEnd type="none" w="med" len="med"/>
-                    </a:lnL>
-                    <a:lnT w="12700" cap="flat" cmpd="sng" algn="ctr">
-                      <a:noFill/>
-                      <a:prstDash val="solid"/>
-                      <a:round/>
-                      <a:headEnd type="none" w="med" len="med"/>
-                      <a:tailEnd type="none" w="med" len="med"/>
-                    </a:lnT>
-                    <a:lnB w="12700" cap="flat" cmpd="sng" algn="ctr">
-                      <a:solidFill>
-                        <a:schemeClr val="tx1"/>
-                      </a:solidFill>
-                      <a:prstDash val="solid"/>
-                      <a:round/>
-                      <a:headEnd type="none" w="med" len="med"/>
-                      <a:tailEnd type="none" w="med" len="med"/>
-                    </a:lnB>
-                    <a:noFill/>
-                  </a:tcPr>
-                </a:tc>
-              </a:tr>
-              <a:tr h="370840">
-                <a:tc>
-                  <a:txBody>
-                    <a:bodyPr/>
-                    <a:lstStyle/>
-                    <a:p>
-                      <a:pPr algn="ctr"/>
-                      <a:r>
-                        <a:rPr lang="en-US" b="0" dirty="0" smtClean="0">
-                          <a:solidFill>
-                            <a:srgbClr val="0070C0"/>
-                          </a:solidFill>
-                        </a:rPr>
-                        <a:t>drug</a:t>
-                      </a:r>
-                      <a:endParaRPr lang="en-US" b="0" dirty="0">
-                        <a:solidFill>
-                          <a:srgbClr val="0070C0"/>
-                        </a:solidFill>
-                      </a:endParaRPr>
-                    </a:p>
-                  </a:txBody>
-                  <a:tcPr>
-                    <a:lnR w="12700" cap="flat" cmpd="sng" algn="ctr">
-                      <a:noFill/>
-                      <a:prstDash val="solid"/>
-                      <a:round/>
-                      <a:headEnd type="none" w="med" len="med"/>
-                      <a:tailEnd type="none" w="med" len="med"/>
-                    </a:lnR>
-                    <a:lnT w="12700" cap="flat" cmpd="sng" algn="ctr">
-                      <a:solidFill>
-                        <a:schemeClr val="tx1"/>
-                      </a:solidFill>
-                      <a:prstDash val="solid"/>
-                      <a:round/>
-                      <a:headEnd type="none" w="med" len="med"/>
-                      <a:tailEnd type="none" w="med" len="med"/>
-                    </a:lnT>
-                    <a:noFill/>
-                  </a:tcPr>
-                </a:tc>
-                <a:tc>
-                  <a:txBody>
-                    <a:bodyPr/>
-                    <a:lstStyle/>
-                    <a:p>
-                      <a:pPr algn="ctr"/>
-                      <a:r>
-                        <a:rPr lang="en-US" dirty="0" smtClean="0">
-                          <a:solidFill>
-                            <a:srgbClr val="0070C0"/>
-                          </a:solidFill>
-                        </a:rPr>
-                        <a:t>survived</a:t>
-                      </a:r>
-                      <a:endParaRPr lang="en-US" dirty="0">
-                        <a:solidFill>
-                          <a:srgbClr val="0070C0"/>
-                        </a:solidFill>
-                      </a:endParaRPr>
-                    </a:p>
-                  </a:txBody>
-                  <a:tcPr>
-                    <a:lnL w="12700" cap="flat" cmpd="sng" algn="ctr">
-                      <a:noFill/>
-                      <a:prstDash val="solid"/>
-                      <a:round/>
-                      <a:headEnd type="none" w="med" len="med"/>
-                      <a:tailEnd type="none" w="med" len="med"/>
-                    </a:lnL>
-                    <a:lnR w="12700" cap="flat" cmpd="sng" algn="ctr">
-                      <a:noFill/>
-                      <a:prstDash val="solid"/>
-                      <a:round/>
-                      <a:headEnd type="none" w="med" len="med"/>
-                      <a:tailEnd type="none" w="med" len="med"/>
-                    </a:lnR>
-                    <a:lnT w="12700" cap="flat" cmpd="sng" algn="ctr">
-                      <a:solidFill>
-                        <a:schemeClr val="tx1"/>
-                      </a:solidFill>
-                      <a:prstDash val="solid"/>
-                      <a:round/>
-                      <a:headEnd type="none" w="med" len="med"/>
-                      <a:tailEnd type="none" w="med" len="med"/>
-                    </a:lnT>
-                    <a:noFill/>
-                  </a:tcPr>
-                </a:tc>
-                <a:tc>
-                  <a:txBody>
-                    <a:bodyPr/>
-                    <a:lstStyle/>
-                    <a:p>
-                      <a:pPr algn="ctr"/>
-                      <a:r>
-                        <a:rPr lang="en-US" dirty="0" smtClean="0">
-                          <a:solidFill>
-                            <a:srgbClr val="0070C0"/>
-                          </a:solidFill>
-                        </a:rPr>
-                        <a:t>15</a:t>
-                      </a:r>
-                      <a:endParaRPr lang="en-US" dirty="0">
-                        <a:solidFill>
-                          <a:srgbClr val="0070C0"/>
-                        </a:solidFill>
-                      </a:endParaRPr>
-                    </a:p>
-                  </a:txBody>
-                  <a:tcPr>
-                    <a:lnL w="12700" cap="flat" cmpd="sng" algn="ctr">
-                      <a:noFill/>
-                      <a:prstDash val="solid"/>
-                      <a:round/>
-                      <a:headEnd type="none" w="med" len="med"/>
-                      <a:tailEnd type="none" w="med" len="med"/>
-                    </a:lnL>
-                    <a:lnT w="12700" cap="flat" cmpd="sng" algn="ctr">
-                      <a:solidFill>
-                        <a:schemeClr val="tx1"/>
-                      </a:solidFill>
-                      <a:prstDash val="solid"/>
-                      <a:round/>
-                      <a:headEnd type="none" w="med" len="med"/>
-                      <a:tailEnd type="none" w="med" len="med"/>
-                    </a:lnT>
-                    <a:noFill/>
-                  </a:tcPr>
-                </a:tc>
-              </a:tr>
-              <a:tr h="370840">
-                <a:tc>
-                  <a:txBody>
-                    <a:bodyPr/>
-                    <a:lstStyle/>
-                    <a:p>
-                      <a:pPr algn="ctr"/>
-                      <a:r>
-                        <a:rPr lang="en-US" b="0" dirty="0" smtClean="0">
-                          <a:solidFill>
-                            <a:srgbClr val="0070C0"/>
-                          </a:solidFill>
-                        </a:rPr>
-                        <a:t>placebo</a:t>
-                      </a:r>
-                      <a:endParaRPr lang="en-US" b="0" dirty="0">
-                        <a:solidFill>
-                          <a:srgbClr val="0070C0"/>
-                        </a:solidFill>
-                      </a:endParaRPr>
-                    </a:p>
-                  </a:txBody>
-                  <a:tcPr>
-                    <a:lnR w="12700" cap="flat" cmpd="sng" algn="ctr">
-                      <a:noFill/>
-                      <a:prstDash val="solid"/>
-                      <a:round/>
-                      <a:headEnd type="none" w="med" len="med"/>
-                      <a:tailEnd type="none" w="med" len="med"/>
-                    </a:lnR>
-                    <a:noFill/>
-                  </a:tcPr>
-                </a:tc>
-                <a:tc>
-                  <a:txBody>
-                    <a:bodyPr/>
-                    <a:lstStyle/>
-                    <a:p>
-                      <a:pPr algn="ctr"/>
-                      <a:r>
-                        <a:rPr lang="en-US" dirty="0" smtClean="0">
-                          <a:solidFill>
-                            <a:srgbClr val="0070C0"/>
-                          </a:solidFill>
-                        </a:rPr>
-                        <a:t>survived</a:t>
-                      </a:r>
-                      <a:endParaRPr lang="en-US" dirty="0">
-                        <a:solidFill>
-                          <a:srgbClr val="0070C0"/>
-                        </a:solidFill>
-                      </a:endParaRPr>
-                    </a:p>
-                  </a:txBody>
-                  <a:tcPr>
-                    <a:lnL w="12700" cap="flat" cmpd="sng" algn="ctr">
-                      <a:noFill/>
-                      <a:prstDash val="solid"/>
-                      <a:round/>
-                      <a:headEnd type="none" w="med" len="med"/>
-                      <a:tailEnd type="none" w="med" len="med"/>
-                    </a:lnL>
-                    <a:lnR w="12700" cap="flat" cmpd="sng" algn="ctr">
-                      <a:noFill/>
-                      <a:prstDash val="solid"/>
-                      <a:round/>
-                      <a:headEnd type="none" w="med" len="med"/>
-                      <a:tailEnd type="none" w="med" len="med"/>
-                    </a:lnR>
-                    <a:noFill/>
-                  </a:tcPr>
-                </a:tc>
-                <a:tc>
-                  <a:txBody>
-                    <a:bodyPr/>
-                    <a:lstStyle/>
-                    <a:p>
-                      <a:pPr algn="ctr"/>
-                      <a:r>
-                        <a:rPr lang="en-US" dirty="0" smtClean="0">
-                          <a:solidFill>
-                            <a:srgbClr val="0070C0"/>
-                          </a:solidFill>
-                        </a:rPr>
-                        <a:t>4</a:t>
-                      </a:r>
-                      <a:endParaRPr lang="en-US" dirty="0">
-                        <a:solidFill>
-                          <a:srgbClr val="0070C0"/>
-                        </a:solidFill>
-                      </a:endParaRPr>
-                    </a:p>
-                  </a:txBody>
-                  <a:tcPr>
-                    <a:lnL w="12700" cap="flat" cmpd="sng" algn="ctr">
-                      <a:noFill/>
-                      <a:prstDash val="solid"/>
-                      <a:round/>
-                      <a:headEnd type="none" w="med" len="med"/>
-                      <a:tailEnd type="none" w="med" len="med"/>
-                    </a:lnL>
-                    <a:noFill/>
-                  </a:tcPr>
-                </a:tc>
-              </a:tr>
-              <a:tr h="370840">
-                <a:tc>
-                  <a:txBody>
-                    <a:bodyPr/>
-                    <a:lstStyle/>
-                    <a:p>
-                      <a:pPr algn="ctr"/>
-                      <a:r>
-                        <a:rPr lang="en-US" b="0" dirty="0" smtClean="0">
-                          <a:solidFill>
-                            <a:srgbClr val="0070C0"/>
-                          </a:solidFill>
-                        </a:rPr>
-                        <a:t>drug</a:t>
-                      </a:r>
-                      <a:endParaRPr lang="en-US" b="0" dirty="0">
-                        <a:solidFill>
-                          <a:srgbClr val="0070C0"/>
-                        </a:solidFill>
-                      </a:endParaRPr>
-                    </a:p>
-                  </a:txBody>
-                  <a:tcPr>
-                    <a:lnR w="12700" cap="flat" cmpd="sng" algn="ctr">
-                      <a:noFill/>
-                      <a:prstDash val="solid"/>
-                      <a:round/>
-                      <a:headEnd type="none" w="med" len="med"/>
-                      <a:tailEnd type="none" w="med" len="med"/>
-                    </a:lnR>
-                    <a:noFill/>
-                  </a:tcPr>
-                </a:tc>
-                <a:tc>
-                  <a:txBody>
-                    <a:bodyPr/>
-                    <a:lstStyle/>
-                    <a:p>
-                      <a:pPr algn="ctr"/>
-                      <a:r>
-                        <a:rPr lang="en-US" dirty="0" smtClean="0">
-                          <a:solidFill>
-                            <a:srgbClr val="0070C0"/>
-                          </a:solidFill>
-                        </a:rPr>
-                        <a:t>died</a:t>
-                      </a:r>
-                      <a:endParaRPr lang="en-US" dirty="0">
-                        <a:solidFill>
-                          <a:srgbClr val="0070C0"/>
-                        </a:solidFill>
-                      </a:endParaRPr>
-                    </a:p>
-                  </a:txBody>
-                  <a:tcPr>
-                    <a:lnL w="12700" cap="flat" cmpd="sng" algn="ctr">
-                      <a:noFill/>
-                      <a:prstDash val="solid"/>
-                      <a:round/>
-                      <a:headEnd type="none" w="med" len="med"/>
-                      <a:tailEnd type="none" w="med" len="med"/>
-                    </a:lnL>
-                    <a:lnR w="12700" cap="flat" cmpd="sng" algn="ctr">
-                      <a:noFill/>
-                      <a:prstDash val="solid"/>
-                      <a:round/>
-                      <a:headEnd type="none" w="med" len="med"/>
-                      <a:tailEnd type="none" w="med" len="med"/>
-                    </a:lnR>
-                    <a:noFill/>
-                  </a:tcPr>
-                </a:tc>
-                <a:tc>
-                  <a:txBody>
-                    <a:bodyPr/>
-                    <a:lstStyle/>
-                    <a:p>
-                      <a:pPr algn="ctr"/>
-                      <a:r>
-                        <a:rPr lang="en-US" dirty="0" smtClean="0">
-                          <a:solidFill>
-                            <a:srgbClr val="0070C0"/>
-                          </a:solidFill>
-                        </a:rPr>
-                        <a:t>3</a:t>
-                      </a:r>
-                      <a:endParaRPr lang="en-US" dirty="0">
-                        <a:solidFill>
-                          <a:srgbClr val="0070C0"/>
-                        </a:solidFill>
-                      </a:endParaRPr>
-                    </a:p>
-                  </a:txBody>
-                  <a:tcPr>
-                    <a:lnL w="12700" cap="flat" cmpd="sng" algn="ctr">
-                      <a:noFill/>
-                      <a:prstDash val="solid"/>
-                      <a:round/>
-                      <a:headEnd type="none" w="med" len="med"/>
-                      <a:tailEnd type="none" w="med" len="med"/>
-                    </a:lnL>
-                    <a:noFill/>
-                  </a:tcPr>
-                </a:tc>
-              </a:tr>
-              <a:tr h="370840">
-                <a:tc>
-                  <a:txBody>
-                    <a:bodyPr/>
-                    <a:lstStyle/>
-                    <a:p>
-                      <a:pPr algn="ctr"/>
-                      <a:r>
-                        <a:rPr lang="en-US" b="0" dirty="0" smtClean="0">
-                          <a:solidFill>
-                            <a:srgbClr val="0070C0"/>
-                          </a:solidFill>
-                        </a:rPr>
-                        <a:t>placebo</a:t>
-                      </a:r>
-                      <a:endParaRPr lang="en-US" b="0" dirty="0">
-                        <a:solidFill>
-                          <a:srgbClr val="0070C0"/>
-                        </a:solidFill>
-                      </a:endParaRPr>
-                    </a:p>
-                  </a:txBody>
-                  <a:tcPr>
-                    <a:lnR w="12700" cap="flat" cmpd="sng" algn="ctr">
-                      <a:noFill/>
-                      <a:prstDash val="solid"/>
-                      <a:round/>
-                      <a:headEnd type="none" w="med" len="med"/>
-                      <a:tailEnd type="none" w="med" len="med"/>
-                    </a:lnR>
-                    <a:noFill/>
-                  </a:tcPr>
-                </a:tc>
-                <a:tc>
-                  <a:txBody>
-                    <a:bodyPr/>
-                    <a:lstStyle/>
-                    <a:p>
-                      <a:pPr algn="ctr"/>
-                      <a:r>
-                        <a:rPr lang="en-US" dirty="0" smtClean="0">
-                          <a:solidFill>
-                            <a:srgbClr val="0070C0"/>
-                          </a:solidFill>
-                        </a:rPr>
-                        <a:t>died</a:t>
-                      </a:r>
-                      <a:endParaRPr lang="en-US" dirty="0">
-                        <a:solidFill>
-                          <a:srgbClr val="0070C0"/>
-                        </a:solidFill>
-                      </a:endParaRPr>
-                    </a:p>
-                  </a:txBody>
-                  <a:tcPr>
-                    <a:lnL w="12700" cap="flat" cmpd="sng" algn="ctr">
-                      <a:noFill/>
-                      <a:prstDash val="solid"/>
-                      <a:round/>
-                      <a:headEnd type="none" w="med" len="med"/>
-                      <a:tailEnd type="none" w="med" len="med"/>
-                    </a:lnL>
-                    <a:lnR w="12700" cap="flat" cmpd="sng" algn="ctr">
-                      <a:noFill/>
-                      <a:prstDash val="solid"/>
-                      <a:round/>
-                      <a:headEnd type="none" w="med" len="med"/>
-                      <a:tailEnd type="none" w="med" len="med"/>
-                    </a:lnR>
-                    <a:noFill/>
-                  </a:tcPr>
-                </a:tc>
-                <a:tc>
-                  <a:txBody>
-                    <a:bodyPr/>
-                    <a:lstStyle/>
-                    <a:p>
-                      <a:pPr algn="ctr"/>
-                      <a:r>
-                        <a:rPr lang="en-US" dirty="0" smtClean="0">
-                          <a:solidFill>
-                            <a:srgbClr val="0070C0"/>
-                          </a:solidFill>
-                        </a:rPr>
-                        <a:t>11</a:t>
-                      </a:r>
-                      <a:endParaRPr lang="en-US" dirty="0">
-                        <a:solidFill>
-                          <a:srgbClr val="0070C0"/>
-                        </a:solidFill>
-                      </a:endParaRPr>
-                    </a:p>
-                  </a:txBody>
-                  <a:tcPr>
-                    <a:lnL w="12700" cap="flat" cmpd="sng" algn="ctr">
-                      <a:noFill/>
-                      <a:prstDash val="solid"/>
-                      <a:round/>
-                      <a:headEnd type="none" w="med" len="med"/>
-                      <a:tailEnd type="none" w="med" len="med"/>
-                    </a:lnL>
-                    <a:noFill/>
-                  </a:tcPr>
-                </a:tc>
-              </a:tr>
-            </a:tbl>
-          </a:graphicData>
-        </a:graphic>
-      </p:graphicFrame>
-    </p:spTree>
-    <p:extLst>
-      <p:ext uri="{BB962C8B-B14F-4D97-AF65-F5344CB8AC3E}">
-        <p14:creationId xmlns:p14="http://schemas.microsoft.com/office/powerpoint/2010/main" val="1113055311"/>
-      </p:ext>
-    </p:extLst>
-  </p:cSld>
-  <p:clrMapOvr>
-    <a:masterClrMapping/>
-  </p:clrMapOvr>
-  <p:timing>
-    <p:tnLst>
-      <p:par>
-        <p:cTn id="1" dur="indefinite" restart="never" nodeType="tmRoot">
-          <p:childTnLst>
-            <p:seq concurrent="1" nextAc="seek">
-              <p:cTn id="2" dur="indefinite" nodeType="mainSeq">
-                <p:childTnLst>
-                  <p:par>
-                    <p:cTn id="3" fill="hold">
-                      <p:stCondLst>
-                        <p:cond delay="indefinite"/>
-                      </p:stCondLst>
-                      <p:childTnLst>
-                        <p:par>
-                          <p:cTn id="4" fill="hold">
-                            <p:stCondLst>
-                              <p:cond delay="0"/>
-                            </p:stCondLst>
-                            <p:childTnLst>
-                              <p:par>
-                                <p:cTn id="5" presetID="1" presetClass="entr" presetSubtype="0" fill="hold" nodeType="clickEffect">
-                                  <p:stCondLst>
-                                    <p:cond delay="0"/>
-                                  </p:stCondLst>
-                                  <p:childTnLst>
-                                    <p:set>
-                                      <p:cBhvr>
-                                        <p:cTn id="6" dur="1" fill="hold">
-                                          <p:stCondLst>
-                                            <p:cond delay="0"/>
-                                          </p:stCondLst>
-                                        </p:cTn>
-                                        <p:tgtEl>
-                                          <p:spTgt spid="8"/>
-                                        </p:tgtEl>
-                                        <p:attrNameLst>
-                                          <p:attrName>style.visibility</p:attrName>
-                                        </p:attrNameLst>
-                                      </p:cBhvr>
-                                      <p:to>
-                                        <p:strVal val="visible"/>
-                                      </p:to>
-                                    </p:set>
-                                  </p:childTnLst>
-                                </p:cTn>
-                              </p:par>
-                            </p:childTnLst>
-                          </p:cTn>
-                        </p:par>
-                      </p:childTnLst>
-                    </p:cTn>
-                  </p:par>
-                </p:childTnLst>
-              </p:cTn>
-              <p:prevCondLst>
-                <p:cond evt="onPrev" delay="0">
-                  <p:tgtEl>
-                    <p:sldTgt/>
-                  </p:tgtEl>
-                </p:cond>
-              </p:prevCondLst>
-              <p:nextCondLst>
-                <p:cond evt="onNext" delay="0">
-                  <p:tgtEl>
-                    <p:sldTgt/>
-                  </p:tgtEl>
-                </p:cond>
-              </p:nextCondLst>
-            </p:seq>
-          </p:childTnLst>
-        </p:cTn>
-      </p:par>
-    </p:tnLst>
-  </p:timing>
-</p:sld>
-</file>
-
-<file path=ppt/slides/slide6.xml><?xml version="1.0" encoding="utf-8"?>
-<p:sld xmlns:a="http://schemas.openxmlformats.org/drawingml/2006/main" xmlns:r="http://schemas.openxmlformats.org/officeDocument/2006/relationships" xmlns:p="http://schemas.openxmlformats.org/presentationml/2006/main">
-  <p:cSld>
-    <p:spTree>
-      <p:nvGrpSpPr>
-        <p:cNvPr id="1" name=""/>
-        <p:cNvGrpSpPr/>
-        <p:nvPr/>
-      </p:nvGrpSpPr>
-      <p:grpSpPr>
-        <a:xfrm>
-          <a:off x="0" y="0"/>
-          <a:ext cx="0" cy="0"/>
-          <a:chOff x="0" y="0"/>
-          <a:chExt cx="0" cy="0"/>
-        </a:xfrm>
-      </p:grpSpPr>
-      <p:sp>
-        <p:nvSpPr>
-          <p:cNvPr id="2" name="Title 1"/>
-          <p:cNvSpPr>
-            <a:spLocks noGrp="1"/>
-          </p:cNvSpPr>
-          <p:nvPr>
-            <p:ph type="title"/>
-          </p:nvPr>
-        </p:nvSpPr>
-        <p:spPr/>
-        <p:txBody>
-          <a:bodyPr/>
-          <a:lstStyle/>
-          <a:p>
-            <a:r>
-              <a:rPr lang="en-US" dirty="0" smtClean="0"/>
               <a:t>Working with tidy data</a:t>
             </a:r>
             <a:endParaRPr lang="en-US" dirty="0"/>
@@ -6275,7 +4868,7 @@
 </p:sld>
 </file>
 
-<file path=ppt/slides/slide7.xml><?xml version="1.0" encoding="utf-8"?>
+<file path=ppt/slides/slide5.xml><?xml version="1.0" encoding="utf-8"?>
 <p:sld xmlns:a="http://schemas.openxmlformats.org/drawingml/2006/main" xmlns:r="http://schemas.openxmlformats.org/officeDocument/2006/relationships" xmlns:p="http://schemas.openxmlformats.org/presentationml/2006/main">
   <p:cSld>
     <p:spTree>
@@ -6991,7 +5584,7 @@
 </p:sld>
 </file>
 
-<file path=ppt/slides/slide8.xml><?xml version="1.0" encoding="utf-8"?>
+<file path=ppt/slides/slide6.xml><?xml version="1.0" encoding="utf-8"?>
 <p:sld xmlns:a="http://schemas.openxmlformats.org/drawingml/2006/main" xmlns:r="http://schemas.openxmlformats.org/officeDocument/2006/relationships" xmlns:p="http://schemas.openxmlformats.org/presentationml/2006/main">
   <p:cSld>
     <p:spTree>
@@ -7585,7 +6178,7 @@
 </p:sld>
 </file>
 
-<file path=ppt/slides/slide9.xml><?xml version="1.0" encoding="utf-8"?>
+<file path=ppt/slides/slide7.xml><?xml version="1.0" encoding="utf-8"?>
 <p:sld xmlns:a="http://schemas.openxmlformats.org/drawingml/2006/main" xmlns:r="http://schemas.openxmlformats.org/officeDocument/2006/relationships" xmlns:p="http://schemas.openxmlformats.org/presentationml/2006/main">
   <p:cSld>
     <p:spTree>
@@ -7792,6 +6385,116 @@
     <p:extLst>
       <p:ext uri="{BB962C8B-B14F-4D97-AF65-F5344CB8AC3E}">
         <p14:creationId xmlns:p14="http://schemas.microsoft.com/office/powerpoint/2010/main" val="1652456949"/>
+      </p:ext>
+    </p:extLst>
+  </p:cSld>
+  <p:clrMapOvr>
+    <a:masterClrMapping/>
+  </p:clrMapOvr>
+  <p:timing>
+    <p:tnLst>
+      <p:par>
+        <p:cTn id="1" dur="indefinite" restart="never" nodeType="tmRoot"/>
+      </p:par>
+    </p:tnLst>
+  </p:timing>
+</p:sld>
+</file>
+
+<file path=ppt/slides/slide8.xml><?xml version="1.0" encoding="utf-8"?>
+<p:sld xmlns:a="http://schemas.openxmlformats.org/drawingml/2006/main" xmlns:r="http://schemas.openxmlformats.org/officeDocument/2006/relationships" xmlns:p="http://schemas.openxmlformats.org/presentationml/2006/main">
+  <p:cSld>
+    <p:spTree>
+      <p:nvGrpSpPr>
+        <p:cNvPr id="1" name=""/>
+        <p:cNvGrpSpPr/>
+        <p:nvPr/>
+      </p:nvGrpSpPr>
+      <p:grpSpPr>
+        <a:xfrm>
+          <a:off x="0" y="0"/>
+          <a:ext cx="0" cy="0"/>
+          <a:chOff x="0" y="0"/>
+          <a:chExt cx="0" cy="0"/>
+        </a:xfrm>
+      </p:grpSpPr>
+      <p:sp>
+        <p:nvSpPr>
+          <p:cNvPr id="2" name="Title 1"/>
+          <p:cNvSpPr>
+            <a:spLocks noGrp="1"/>
+          </p:cNvSpPr>
+          <p:nvPr>
+            <p:ph type="title"/>
+          </p:nvPr>
+        </p:nvSpPr>
+        <p:spPr/>
+        <p:txBody>
+          <a:bodyPr/>
+          <a:lstStyle/>
+          <a:p>
+            <a:endParaRPr lang="en-US"/>
+          </a:p>
+        </p:txBody>
+      </p:sp>
+      <p:sp>
+        <p:nvSpPr>
+          <p:cNvPr id="3" name="Content Placeholder 2"/>
+          <p:cNvSpPr>
+            <a:spLocks noGrp="1"/>
+          </p:cNvSpPr>
+          <p:nvPr>
+            <p:ph idx="1"/>
+          </p:nvPr>
+        </p:nvSpPr>
+        <p:spPr/>
+        <p:txBody>
+          <a:bodyPr/>
+          <a:lstStyle/>
+          <a:p>
+            <a:r>
+              <a:rPr lang="en-US" dirty="0" smtClean="0"/>
+              <a:t>show a few </a:t>
+            </a:r>
+            <a:r>
+              <a:rPr lang="en-US" dirty="0" err="1" smtClean="0"/>
+              <a:t>dplyr</a:t>
+            </a:r>
+            <a:r>
+              <a:rPr lang="en-US" dirty="0" smtClean="0"/>
+              <a:t> examples, break for exercises</a:t>
+            </a:r>
+          </a:p>
+          <a:p>
+            <a:r>
+              <a:rPr lang="en-US" dirty="0" smtClean="0"/>
+              <a:t>show a few </a:t>
+            </a:r>
+            <a:r>
+              <a:rPr lang="en-US" dirty="0" err="1" smtClean="0"/>
+              <a:t>ggplot</a:t>
+            </a:r>
+            <a:r>
+              <a:rPr lang="en-US" dirty="0" smtClean="0"/>
+              <a:t> examples, break for exercises</a:t>
+            </a:r>
+          </a:p>
+          <a:p>
+            <a:endParaRPr lang="en-US" dirty="0"/>
+          </a:p>
+          <a:p>
+            <a:r>
+              <a:rPr lang="en-US" dirty="0" smtClean="0"/>
+              <a:t>for the worksheet, plot the HW</a:t>
+            </a:r>
+            <a:endParaRPr lang="en-US" dirty="0"/>
+          </a:p>
+        </p:txBody>
+      </p:sp>
+    </p:spTree>
+    <p:extLst>
+      <p:ext uri="{BB962C8B-B14F-4D97-AF65-F5344CB8AC3E}">
+        <p14:creationId xmlns:p14="http://schemas.microsoft.com/office/powerpoint/2010/main" val="1100881684"/>
       </p:ext>
     </p:extLst>
   </p:cSld>

</xml_diff>